<commit_message>
updates for brown bag lunch
</commit_message>
<xml_diff>
--- a/slides/HTMap.pptx
+++ b/slides/HTMap.pptx
@@ -26,13 +26,15 @@
       <p:font typeface="Source Code Pro" panose="020B0509030403020204" pitchFamily="49" charset="0"/>
       <p:regular r:id="rId13"/>
       <p:bold r:id="rId14"/>
+      <p:italic r:id="rId15"/>
+      <p:boldItalic r:id="rId16"/>
     </p:embeddedFont>
     <p:embeddedFont>
       <p:font typeface="Source Sans Pro" panose="020B0503030403020204" pitchFamily="34" charset="0"/>
-      <p:regular r:id="rId15"/>
-      <p:bold r:id="rId16"/>
-      <p:italic r:id="rId17"/>
-      <p:boldItalic r:id="rId18"/>
+      <p:regular r:id="rId17"/>
+      <p:bold r:id="rId18"/>
+      <p:italic r:id="rId19"/>
+      <p:boldItalic r:id="rId20"/>
     </p:embeddedFont>
   </p:embeddedFontLst>
   <p:defaultTextStyle>
@@ -2852,47 +2854,6 @@
         </a:p>
       </dgm:t>
     </dgm:pt>
-    <dgm:pt modelId="{F909E806-C5BE-4035-8FAA-8088D7DD188D}">
-      <dgm:prSet/>
-      <dgm:spPr>
-        <a:solidFill>
-          <a:srgbClr val="3772A4"/>
-        </a:solidFill>
-      </dgm:spPr>
-      <dgm:t>
-        <a:bodyPr/>
-        <a:lstStyle/>
-        <a:p>
-          <a:r>
-            <a:rPr lang="en-US" dirty="0"/>
-            <a:t>“The output of my analysis is a file”</a:t>
-          </a:r>
-          <a:endParaRPr lang="en-US" b="1" dirty="0"/>
-        </a:p>
-      </dgm:t>
-    </dgm:pt>
-    <dgm:pt modelId="{B98FE46B-CAD0-45D8-A896-62077B8E0412}" type="parTrans" cxnId="{F1BA61EB-8CB9-4990-A03F-A30AB8487E57}">
-      <dgm:prSet/>
-      <dgm:spPr/>
-      <dgm:t>
-        <a:bodyPr/>
-        <a:lstStyle/>
-        <a:p>
-          <a:endParaRPr lang="en-US"/>
-        </a:p>
-      </dgm:t>
-    </dgm:pt>
-    <dgm:pt modelId="{09CB383F-BF72-4809-9B1C-0BB697AFBDCB}" type="sibTrans" cxnId="{F1BA61EB-8CB9-4990-A03F-A30AB8487E57}">
-      <dgm:prSet/>
-      <dgm:spPr/>
-      <dgm:t>
-        <a:bodyPr/>
-        <a:lstStyle/>
-        <a:p>
-          <a:endParaRPr lang="en-US"/>
-        </a:p>
-      </dgm:t>
-    </dgm:pt>
     <dgm:pt modelId="{FD93EF99-080F-411C-BA66-6F172AD8872A}">
       <dgm:prSet/>
       <dgm:spPr>
@@ -2945,10 +2906,9 @@
         <a:lstStyle/>
         <a:p>
           <a:r>
-            <a:rPr lang="en-US"/>
-            <a:t>“But I don’t use Python…”</a:t>
+            <a:rPr lang="en-US" dirty="0"/>
+            <a:t>“I don’t use Python for my science code”</a:t>
           </a:r>
-          <a:endParaRPr lang="en-US" dirty="0"/>
         </a:p>
       </dgm:t>
     </dgm:pt>
@@ -2997,20 +2957,8 @@
       <dgm:prSet presAssocID="{085F89EC-96F3-4A98-A3DF-76D7C580B568}" presName="linearProcess" presStyleCnt="0"/>
       <dgm:spPr/>
     </dgm:pt>
-    <dgm:pt modelId="{DCA13A8E-F3CF-41FE-B45C-8310856EAFF6}" type="pres">
-      <dgm:prSet presAssocID="{F909E806-C5BE-4035-8FAA-8088D7DD188D}" presName="textNode" presStyleLbl="node1" presStyleIdx="0" presStyleCnt="3">
-        <dgm:presLayoutVars>
-          <dgm:bulletEnabled val="1"/>
-        </dgm:presLayoutVars>
-      </dgm:prSet>
-      <dgm:spPr/>
-    </dgm:pt>
-    <dgm:pt modelId="{1FF61528-2633-4E26-9C80-F62E9117450D}" type="pres">
-      <dgm:prSet presAssocID="{09CB383F-BF72-4809-9B1C-0BB697AFBDCB}" presName="sibTrans" presStyleCnt="0"/>
-      <dgm:spPr/>
-    </dgm:pt>
     <dgm:pt modelId="{623EFA28-4E35-409A-90ED-4E5EC79D0C32}" type="pres">
-      <dgm:prSet presAssocID="{FD93EF99-080F-411C-BA66-6F172AD8872A}" presName="textNode" presStyleLbl="node1" presStyleIdx="1" presStyleCnt="3">
+      <dgm:prSet presAssocID="{FD93EF99-080F-411C-BA66-6F172AD8872A}" presName="textNode" presStyleLbl="node1" presStyleIdx="0" presStyleCnt="2">
         <dgm:presLayoutVars>
           <dgm:bulletEnabled val="1"/>
         </dgm:presLayoutVars>
@@ -3022,7 +2970,7 @@
       <dgm:spPr/>
     </dgm:pt>
     <dgm:pt modelId="{A8DCA58E-AE84-4D65-9AE9-54048A2A8FF8}" type="pres">
-      <dgm:prSet presAssocID="{650BE8B7-FD67-49F3-A59F-74D600FCCBA8}" presName="textNode" presStyleLbl="node1" presStyleIdx="2" presStyleCnt="3">
+      <dgm:prSet presAssocID="{650BE8B7-FD67-49F3-A59F-74D600FCCBA8}" presName="textNode" presStyleLbl="node1" presStyleIdx="1" presStyleCnt="2">
         <dgm:presLayoutVars>
           <dgm:bulletEnabled val="1"/>
         </dgm:presLayoutVars>
@@ -3031,20 +2979,16 @@
     </dgm:pt>
   </dgm:ptLst>
   <dgm:cxnLst>
-    <dgm:cxn modelId="{B1FA0A1A-2873-44D9-8F90-BA0A47F991CF}" type="presOf" srcId="{F909E806-C5BE-4035-8FAA-8088D7DD188D}" destId="{DCA13A8E-F3CF-41FE-B45C-8310856EAFF6}" srcOrd="0" destOrd="0" presId="urn:microsoft.com/office/officeart/2005/8/layout/hProcess9"/>
-    <dgm:cxn modelId="{DD5E0436-78C7-4CF9-B2FC-8FABCA04870C}" srcId="{085F89EC-96F3-4A98-A3DF-76D7C580B568}" destId="{650BE8B7-FD67-49F3-A59F-74D600FCCBA8}" srcOrd="2" destOrd="0" parTransId="{1FEFC1DF-82AB-46D1-B4AC-05F8F611437D}" sibTransId="{1CB64BBA-6250-4961-A79A-A01E2E6C67FE}"/>
+    <dgm:cxn modelId="{DD5E0436-78C7-4CF9-B2FC-8FABCA04870C}" srcId="{085F89EC-96F3-4A98-A3DF-76D7C580B568}" destId="{650BE8B7-FD67-49F3-A59F-74D600FCCBA8}" srcOrd="1" destOrd="0" parTransId="{1FEFC1DF-82AB-46D1-B4AC-05F8F611437D}" sibTransId="{1CB64BBA-6250-4961-A79A-A01E2E6C67FE}"/>
     <dgm:cxn modelId="{0BD9AD5B-1CAC-430C-839F-772D477D3AB2}" type="presOf" srcId="{650BE8B7-FD67-49F3-A59F-74D600FCCBA8}" destId="{A8DCA58E-AE84-4D65-9AE9-54048A2A8FF8}" srcOrd="0" destOrd="0" presId="urn:microsoft.com/office/officeart/2005/8/layout/hProcess9"/>
-    <dgm:cxn modelId="{D4AD5A4E-B2DF-4D8E-8768-AB7532194242}" srcId="{085F89EC-96F3-4A98-A3DF-76D7C580B568}" destId="{FD93EF99-080F-411C-BA66-6F172AD8872A}" srcOrd="1" destOrd="0" parTransId="{CF60948D-0A2B-4F2D-A07E-1CF257408B6B}" sibTransId="{2D269C59-B093-414E-AE3E-D81E38222C31}"/>
+    <dgm:cxn modelId="{D4AD5A4E-B2DF-4D8E-8768-AB7532194242}" srcId="{085F89EC-96F3-4A98-A3DF-76D7C580B568}" destId="{FD93EF99-080F-411C-BA66-6F172AD8872A}" srcOrd="0" destOrd="0" parTransId="{CF60948D-0A2B-4F2D-A07E-1CF257408B6B}" sibTransId="{2D269C59-B093-414E-AE3E-D81E38222C31}"/>
     <dgm:cxn modelId="{60BF9153-192C-492F-B6B4-29F8FCBA50CA}" type="presOf" srcId="{FD93EF99-080F-411C-BA66-6F172AD8872A}" destId="{623EFA28-4E35-409A-90ED-4E5EC79D0C32}" srcOrd="0" destOrd="0" presId="urn:microsoft.com/office/officeart/2005/8/layout/hProcess9"/>
     <dgm:cxn modelId="{9B9EA973-2F9E-40AB-8A15-A9216ADA80F9}" type="presOf" srcId="{085F89EC-96F3-4A98-A3DF-76D7C580B568}" destId="{D7315C6C-1D7F-421D-900A-B5D6C7B895E7}" srcOrd="0" destOrd="0" presId="urn:microsoft.com/office/officeart/2005/8/layout/hProcess9"/>
-    <dgm:cxn modelId="{F1BA61EB-8CB9-4990-A03F-A30AB8487E57}" srcId="{085F89EC-96F3-4A98-A3DF-76D7C580B568}" destId="{F909E806-C5BE-4035-8FAA-8088D7DD188D}" srcOrd="0" destOrd="0" parTransId="{B98FE46B-CAD0-45D8-A896-62077B8E0412}" sibTransId="{09CB383F-BF72-4809-9B1C-0BB697AFBDCB}"/>
     <dgm:cxn modelId="{12202063-2247-45E4-B62C-367AD935150D}" type="presParOf" srcId="{D7315C6C-1D7F-421D-900A-B5D6C7B895E7}" destId="{6C2A659A-9CDE-4E27-8F7B-D71A4E60E6CB}" srcOrd="0" destOrd="0" presId="urn:microsoft.com/office/officeart/2005/8/layout/hProcess9"/>
     <dgm:cxn modelId="{70EA766E-ED4F-4300-866C-47966512B63A}" type="presParOf" srcId="{D7315C6C-1D7F-421D-900A-B5D6C7B895E7}" destId="{E6A3FFA2-E4DF-4A9C-927A-4EDCA6ED0F95}" srcOrd="1" destOrd="0" presId="urn:microsoft.com/office/officeart/2005/8/layout/hProcess9"/>
-    <dgm:cxn modelId="{A9C92D56-D635-4767-B9EA-0D05D02D77E8}" type="presParOf" srcId="{E6A3FFA2-E4DF-4A9C-927A-4EDCA6ED0F95}" destId="{DCA13A8E-F3CF-41FE-B45C-8310856EAFF6}" srcOrd="0" destOrd="0" presId="urn:microsoft.com/office/officeart/2005/8/layout/hProcess9"/>
-    <dgm:cxn modelId="{879E4291-2BCC-45DB-B7FC-427778D0BCE1}" type="presParOf" srcId="{E6A3FFA2-E4DF-4A9C-927A-4EDCA6ED0F95}" destId="{1FF61528-2633-4E26-9C80-F62E9117450D}" srcOrd="1" destOrd="0" presId="urn:microsoft.com/office/officeart/2005/8/layout/hProcess9"/>
-    <dgm:cxn modelId="{09FCF34D-C196-45FB-BA6E-28B2C9200840}" type="presParOf" srcId="{E6A3FFA2-E4DF-4A9C-927A-4EDCA6ED0F95}" destId="{623EFA28-4E35-409A-90ED-4E5EC79D0C32}" srcOrd="2" destOrd="0" presId="urn:microsoft.com/office/officeart/2005/8/layout/hProcess9"/>
-    <dgm:cxn modelId="{358AEF56-8202-42C2-A860-5E4E1295F5C9}" type="presParOf" srcId="{E6A3FFA2-E4DF-4A9C-927A-4EDCA6ED0F95}" destId="{4C924C85-6E5E-4079-A9B4-A3FB17C95989}" srcOrd="3" destOrd="0" presId="urn:microsoft.com/office/officeart/2005/8/layout/hProcess9"/>
-    <dgm:cxn modelId="{40FDA7CE-1274-458E-97C2-EECCB29AC909}" type="presParOf" srcId="{E6A3FFA2-E4DF-4A9C-927A-4EDCA6ED0F95}" destId="{A8DCA58E-AE84-4D65-9AE9-54048A2A8FF8}" srcOrd="4" destOrd="0" presId="urn:microsoft.com/office/officeart/2005/8/layout/hProcess9"/>
+    <dgm:cxn modelId="{09FCF34D-C196-45FB-BA6E-28B2C9200840}" type="presParOf" srcId="{E6A3FFA2-E4DF-4A9C-927A-4EDCA6ED0F95}" destId="{623EFA28-4E35-409A-90ED-4E5EC79D0C32}" srcOrd="0" destOrd="0" presId="urn:microsoft.com/office/officeart/2005/8/layout/hProcess9"/>
+    <dgm:cxn modelId="{358AEF56-8202-42C2-A860-5E4E1295F5C9}" type="presParOf" srcId="{E6A3FFA2-E4DF-4A9C-927A-4EDCA6ED0F95}" destId="{4C924C85-6E5E-4079-A9B4-A3FB17C95989}" srcOrd="1" destOrd="0" presId="urn:microsoft.com/office/officeart/2005/8/layout/hProcess9"/>
+    <dgm:cxn modelId="{40FDA7CE-1274-458E-97C2-EECCB29AC909}" type="presParOf" srcId="{E6A3FFA2-E4DF-4A9C-927A-4EDCA6ED0F95}" destId="{A8DCA58E-AE84-4D65-9AE9-54048A2A8FF8}" srcOrd="2" destOrd="0" presId="urn:microsoft.com/office/officeart/2005/8/layout/hProcess9"/>
   </dgm:cxnLst>
   <dgm:bg/>
   <dgm:whole/>
@@ -3615,15 +3559,15 @@
         <a:fontRef idx="minor"/>
       </dsp:style>
     </dsp:sp>
-    <dsp:sp modelId="{DCA13A8E-F3CF-41FE-B45C-8310856EAFF6}">
+    <dsp:sp modelId="{623EFA28-4E35-409A-90ED-4E5EC79D0C32}">
       <dsp:nvSpPr>
         <dsp:cNvPr id="0" name=""/>
         <dsp:cNvSpPr/>
       </dsp:nvSpPr>
       <dsp:spPr>
         <a:xfrm>
-          <a:off x="12355" y="954199"/>
-          <a:ext cx="3702177" cy="1272266"/>
+          <a:off x="1656909" y="954199"/>
+          <a:ext cx="3953781" cy="1272266"/>
         </a:xfrm>
         <a:prstGeom prst="roundRect">
           <a:avLst/>
@@ -3660,12 +3604,12 @@
         </a:fontRef>
       </dsp:style>
       <dsp:txBody>
-        <a:bodyPr spcFirstLastPara="0" vert="horz" wrap="square" lIns="118110" tIns="118110" rIns="118110" bIns="118110" numCol="1" spcCol="1270" anchor="ctr" anchorCtr="0">
+        <a:bodyPr spcFirstLastPara="0" vert="horz" wrap="square" lIns="121920" tIns="121920" rIns="121920" bIns="121920" numCol="1" spcCol="1270" anchor="ctr" anchorCtr="0">
           <a:noAutofit/>
         </a:bodyPr>
         <a:lstStyle/>
         <a:p>
-          <a:pPr marL="0" lvl="0" indent="0" algn="ctr" defTabSz="1377950">
+          <a:pPr marL="0" lvl="0" indent="0" algn="ctr" defTabSz="1422400">
             <a:lnSpc>
               <a:spcPct val="90000"/>
             </a:lnSpc>
@@ -3678,26 +3622,25 @@
             <a:buNone/>
           </a:pPr>
           <a:r>
-            <a:rPr lang="en-US" sz="3100" kern="1200" dirty="0"/>
-            <a:t>“The output of my analysis is a file”</a:t>
+            <a:rPr lang="en-US" sz="3200" kern="1200" dirty="0"/>
+            <a:t>“My function takes a millisecond to run”</a:t>
           </a:r>
-          <a:endParaRPr lang="en-US" sz="3100" b="1" kern="1200" dirty="0"/>
         </a:p>
       </dsp:txBody>
       <dsp:txXfrm>
-        <a:off x="74462" y="1016306"/>
-        <a:ext cx="3577963" cy="1148052"/>
+        <a:off x="1719016" y="1016306"/>
+        <a:ext cx="3829567" cy="1148052"/>
       </dsp:txXfrm>
     </dsp:sp>
-    <dsp:sp modelId="{623EFA28-4E35-409A-90ED-4E5EC79D0C32}">
+    <dsp:sp modelId="{A8DCA58E-AE84-4D65-9AE9-54048A2A8FF8}">
       <dsp:nvSpPr>
         <dsp:cNvPr id="0" name=""/>
         <dsp:cNvSpPr/>
       </dsp:nvSpPr>
       <dsp:spPr>
         <a:xfrm>
-          <a:off x="3899866" y="954199"/>
-          <a:ext cx="3702177" cy="1272266"/>
+          <a:off x="5891219" y="954199"/>
+          <a:ext cx="3953781" cy="1272266"/>
         </a:xfrm>
         <a:prstGeom prst="roundRect">
           <a:avLst/>
@@ -3734,12 +3677,12 @@
         </a:fontRef>
       </dsp:style>
       <dsp:txBody>
-        <a:bodyPr spcFirstLastPara="0" vert="horz" wrap="square" lIns="118110" tIns="118110" rIns="118110" bIns="118110" numCol="1" spcCol="1270" anchor="ctr" anchorCtr="0">
+        <a:bodyPr spcFirstLastPara="0" vert="horz" wrap="square" lIns="121920" tIns="121920" rIns="121920" bIns="121920" numCol="1" spcCol="1270" anchor="ctr" anchorCtr="0">
           <a:noAutofit/>
         </a:bodyPr>
         <a:lstStyle/>
         <a:p>
-          <a:pPr marL="0" lvl="0" indent="0" algn="ctr" defTabSz="1377950">
+          <a:pPr marL="0" lvl="0" indent="0" algn="ctr" defTabSz="1422400">
             <a:lnSpc>
               <a:spcPct val="90000"/>
             </a:lnSpc>
@@ -3752,88 +3695,14 @@
             <a:buNone/>
           </a:pPr>
           <a:r>
-            <a:rPr lang="en-US" sz="3100" kern="1200" dirty="0"/>
-            <a:t>“My function takes a millisecond to run”</a:t>
+            <a:rPr lang="en-US" sz="3200" kern="1200" dirty="0"/>
+            <a:t>“I don’t use Python for my science code”</a:t>
           </a:r>
         </a:p>
       </dsp:txBody>
       <dsp:txXfrm>
-        <a:off x="3961973" y="1016306"/>
-        <a:ext cx="3577963" cy="1148052"/>
-      </dsp:txXfrm>
-    </dsp:sp>
-    <dsp:sp modelId="{A8DCA58E-AE84-4D65-9AE9-54048A2A8FF8}">
-      <dsp:nvSpPr>
-        <dsp:cNvPr id="0" name=""/>
-        <dsp:cNvSpPr/>
-      </dsp:nvSpPr>
-      <dsp:spPr>
-        <a:xfrm>
-          <a:off x="7787377" y="954199"/>
-          <a:ext cx="3702177" cy="1272266"/>
-        </a:xfrm>
-        <a:prstGeom prst="roundRect">
-          <a:avLst/>
-        </a:prstGeom>
-        <a:solidFill>
-          <a:srgbClr val="3772A4"/>
-        </a:solidFill>
-        <a:ln w="12700" cap="flat" cmpd="sng" algn="ctr">
-          <a:solidFill>
-            <a:schemeClr val="lt1">
-              <a:hueOff val="0"/>
-              <a:satOff val="0"/>
-              <a:lumOff val="0"/>
-              <a:alphaOff val="0"/>
-            </a:schemeClr>
-          </a:solidFill>
-          <a:prstDash val="solid"/>
-          <a:miter lim="800000"/>
-        </a:ln>
-        <a:effectLst/>
-      </dsp:spPr>
-      <dsp:style>
-        <a:lnRef idx="2">
-          <a:scrgbClr r="0" g="0" b="0"/>
-        </a:lnRef>
-        <a:fillRef idx="1">
-          <a:scrgbClr r="0" g="0" b="0"/>
-        </a:fillRef>
-        <a:effectRef idx="0">
-          <a:scrgbClr r="0" g="0" b="0"/>
-        </a:effectRef>
-        <a:fontRef idx="minor">
-          <a:schemeClr val="lt1"/>
-        </a:fontRef>
-      </dsp:style>
-      <dsp:txBody>
-        <a:bodyPr spcFirstLastPara="0" vert="horz" wrap="square" lIns="118110" tIns="118110" rIns="118110" bIns="118110" numCol="1" spcCol="1270" anchor="ctr" anchorCtr="0">
-          <a:noAutofit/>
-        </a:bodyPr>
-        <a:lstStyle/>
-        <a:p>
-          <a:pPr marL="0" lvl="0" indent="0" algn="ctr" defTabSz="1377950">
-            <a:lnSpc>
-              <a:spcPct val="90000"/>
-            </a:lnSpc>
-            <a:spcBef>
-              <a:spcPct val="0"/>
-            </a:spcBef>
-            <a:spcAft>
-              <a:spcPct val="35000"/>
-            </a:spcAft>
-            <a:buNone/>
-          </a:pPr>
-          <a:r>
-            <a:rPr lang="en-US" sz="3100" kern="1200"/>
-            <a:t>“But I don’t use Python…”</a:t>
-          </a:r>
-          <a:endParaRPr lang="en-US" sz="3100" kern="1200" dirty="0"/>
-        </a:p>
-      </dsp:txBody>
-      <dsp:txXfrm>
-        <a:off x="7849484" y="1016306"/>
-        <a:ext cx="3577963" cy="1148052"/>
+        <a:off x="5953326" y="1016306"/>
+        <a:ext cx="3829567" cy="1148052"/>
       </dsp:txXfrm>
     </dsp:sp>
   </dsp:spTree>
@@ -7491,7 +7360,7 @@
             <a:fld id="{C2190C43-0954-4454-9B3A-7899E18A0806}" type="datetimeFigureOut">
               <a:rPr lang="en-US" smtClean="0"/>
               <a:pPr/>
-              <a:t>5/22/2019</a:t>
+              <a:t>4/1/2020</a:t>
             </a:fld>
             <a:endParaRPr lang="en-US" dirty="0"/>
           </a:p>
@@ -15536,7 +15405,7 @@
           <p:nvPr>
             <p:extLst>
               <p:ext uri="{D42A27DB-BD31-4B8C-83A1-F6EECF244321}">
-                <p14:modId xmlns:p14="http://schemas.microsoft.com/office/powerpoint/2010/main" val="181617291"/>
+                <p14:modId xmlns:p14="http://schemas.microsoft.com/office/powerpoint/2010/main" val="728065159"/>
               </p:ext>
             </p:extLst>
           </p:nvPr>

</xml_diff>